<commit_message>
复习 restful webservice 和 以及 postman调用post、put、delete的请求
</commit_message>
<xml_diff>
--- a/doc/ppt/第一周/11 Restful Web Service.pptx
+++ b/doc/ppt/第一周/11 Restful Web Service.pptx
@@ -106,6 +106,11 @@
       </a:defRPr>
     </a:lvl9pPr>
   </p:defaultTextStyle>
+  <p:extLst>
+    <p:ext uri="{EFAFB233-063F-42B5-8137-9DF3F51BA10A}">
+      <p15:sldGuideLst xmlns:p15="http://schemas.microsoft.com/office/powerpoint/2012/main"/>
+    </p:ext>
+  </p:extLst>
 </p:presentation>
 </file>
 
@@ -3028,7 +3033,7 @@
         </p:nvSpPr>
         <p:spPr>
           <a:xfrm>
-            <a:off x="2080593" y="5221356"/>
+            <a:off x="2096527" y="4916556"/>
             <a:ext cx="7366119" cy="369332"/>
           </a:xfrm>
           <a:prstGeom prst="rect">
@@ -3082,6 +3087,98 @@
           </a:prstGeom>
         </p:spPr>
       </p:pic>
+      <p:sp>
+        <p:nvSpPr>
+          <p:cNvPr id="2" name="文本框 1"/>
+          <p:cNvSpPr txBox="1"/>
+          <p:nvPr/>
+        </p:nvSpPr>
+        <p:spPr>
+          <a:xfrm>
+            <a:off x="2114159" y="5579164"/>
+            <a:ext cx="7491153" cy="923330"/>
+          </a:xfrm>
+          <a:prstGeom prst="rect">
+            <a:avLst/>
+          </a:prstGeom>
+          <a:noFill/>
+        </p:spPr>
+        <p:txBody>
+          <a:bodyPr wrap="none" rtlCol="0">
+            <a:spAutoFit/>
+          </a:bodyPr>
+          <a:lstStyle/>
+          <a:p>
+            <a:r>
+              <a:rPr lang="zh-CN" altLang="en-US" dirty="0" smtClean="0"/>
+              <a:t>中间一列是路径参数，</a:t>
+            </a:r>
+            <a:r>
+              <a:rPr lang="en-US" altLang="zh-CN" dirty="0" smtClean="0"/>
+              <a:t>eg:localhost:8088/</a:t>
+            </a:r>
+            <a:r>
+              <a:rPr lang="en-US" altLang="zh-CN" dirty="0" err="1" smtClean="0"/>
+              <a:t>getStu</a:t>
+            </a:r>
+            <a:r>
+              <a:rPr lang="en-US" altLang="zh-CN" dirty="0" smtClean="0"/>
+              <a:t>/1203</a:t>
+            </a:r>
+            <a:r>
+              <a:rPr lang="zh-CN" altLang="en-US" dirty="0" smtClean="0"/>
+              <a:t>，</a:t>
+            </a:r>
+            <a:r>
+              <a:rPr lang="en-US" altLang="zh-CN" dirty="0" smtClean="0"/>
+              <a:t>1203</a:t>
+            </a:r>
+            <a:r>
+              <a:rPr lang="zh-CN" altLang="en-US" dirty="0" smtClean="0"/>
+              <a:t>是参数</a:t>
+            </a:r>
+            <a:r>
+              <a:rPr lang="en-US" altLang="zh-CN" dirty="0" smtClean="0"/>
+              <a:t>id</a:t>
+            </a:r>
+            <a:r>
+              <a:rPr lang="zh-CN" altLang="en-US" dirty="0" smtClean="0"/>
+              <a:t>，</a:t>
+            </a:r>
+            <a:endParaRPr lang="en-US" altLang="zh-CN" dirty="0" smtClean="0"/>
+          </a:p>
+          <a:p>
+            <a:r>
+              <a:rPr lang="zh-CN" altLang="en-US" dirty="0" smtClean="0"/>
+              <a:t>但是在这里表示为路径的一部分。</a:t>
+            </a:r>
+            <a:endParaRPr lang="en-US" altLang="zh-CN" dirty="0" smtClean="0"/>
+          </a:p>
+          <a:p>
+            <a:r>
+              <a:rPr lang="zh-CN" altLang="en-US" dirty="0" smtClean="0"/>
+              <a:t>通常是用：</a:t>
+            </a:r>
+            <a:r>
+              <a:rPr lang="en-US" altLang="zh-CN" dirty="0" smtClean="0"/>
+              <a:t>localost:8088/</a:t>
+            </a:r>
+            <a:r>
+              <a:rPr lang="en-US" altLang="zh-CN" dirty="0" err="1" smtClean="0"/>
+              <a:t>getStu?id</a:t>
+            </a:r>
+            <a:r>
+              <a:rPr lang="en-US" altLang="zh-CN" dirty="0" smtClean="0"/>
+              <a:t>=1203</a:t>
+            </a:r>
+            <a:r>
+              <a:rPr lang="zh-CN" altLang="en-US" dirty="0" smtClean="0"/>
+              <a:t>来请求的，可读性也更强</a:t>
+            </a:r>
+            <a:endParaRPr lang="zh-CN" altLang="en-US" dirty="0"/>
+          </a:p>
+        </p:txBody>
+      </p:sp>
     </p:spTree>
     <p:extLst>
       <p:ext uri="{BB962C8B-B14F-4D97-AF65-F5344CB8AC3E}">

</xml_diff>